<commit_message>
updating document (added punctuation)
</commit_message>
<xml_diff>
--- a/assembly/pictures/pdf/fig1b1move18.pptx
+++ b/assembly/pictures/pdf/fig1b1move18.pptx
@@ -288,7 +288,7 @@
           <a:p>
             <a:fld id="{BD062408-EA1B-994F-9E64-636DB23DCB45}" type="datetimeFigureOut">
               <a:rPr lang="en-US" smtClean="0"/>
-              <a:t>5/2/17</a:t>
+              <a:t>5/3/17</a:t>
             </a:fld>
             <a:endParaRPr lang="en-US"/>
           </a:p>
@@ -458,7 +458,7 @@
           <a:p>
             <a:fld id="{BD062408-EA1B-994F-9E64-636DB23DCB45}" type="datetimeFigureOut">
               <a:rPr lang="en-US" smtClean="0"/>
-              <a:t>5/2/17</a:t>
+              <a:t>5/3/17</a:t>
             </a:fld>
             <a:endParaRPr lang="en-US"/>
           </a:p>
@@ -638,7 +638,7 @@
           <a:p>
             <a:fld id="{BD062408-EA1B-994F-9E64-636DB23DCB45}" type="datetimeFigureOut">
               <a:rPr lang="en-US" smtClean="0"/>
-              <a:t>5/2/17</a:t>
+              <a:t>5/3/17</a:t>
             </a:fld>
             <a:endParaRPr lang="en-US"/>
           </a:p>
@@ -808,7 +808,7 @@
           <a:p>
             <a:fld id="{BD062408-EA1B-994F-9E64-636DB23DCB45}" type="datetimeFigureOut">
               <a:rPr lang="en-US" smtClean="0"/>
-              <a:t>5/2/17</a:t>
+              <a:t>5/3/17</a:t>
             </a:fld>
             <a:endParaRPr lang="en-US"/>
           </a:p>
@@ -1054,7 +1054,7 @@
           <a:p>
             <a:fld id="{BD062408-EA1B-994F-9E64-636DB23DCB45}" type="datetimeFigureOut">
               <a:rPr lang="en-US" smtClean="0"/>
-              <a:t>5/2/17</a:t>
+              <a:t>5/3/17</a:t>
             </a:fld>
             <a:endParaRPr lang="en-US"/>
           </a:p>
@@ -1342,7 +1342,7 @@
           <a:p>
             <a:fld id="{BD062408-EA1B-994F-9E64-636DB23DCB45}" type="datetimeFigureOut">
               <a:rPr lang="en-US" smtClean="0"/>
-              <a:t>5/2/17</a:t>
+              <a:t>5/3/17</a:t>
             </a:fld>
             <a:endParaRPr lang="en-US"/>
           </a:p>
@@ -1769,7 +1769,7 @@
           <a:p>
             <a:fld id="{BD062408-EA1B-994F-9E64-636DB23DCB45}" type="datetimeFigureOut">
               <a:rPr lang="en-US" smtClean="0"/>
-              <a:t>5/2/17</a:t>
+              <a:t>5/3/17</a:t>
             </a:fld>
             <a:endParaRPr lang="en-US"/>
           </a:p>
@@ -1887,7 +1887,7 @@
           <a:p>
             <a:fld id="{BD062408-EA1B-994F-9E64-636DB23DCB45}" type="datetimeFigureOut">
               <a:rPr lang="en-US" smtClean="0"/>
-              <a:t>5/2/17</a:t>
+              <a:t>5/3/17</a:t>
             </a:fld>
             <a:endParaRPr lang="en-US"/>
           </a:p>
@@ -1982,7 +1982,7 @@
           <a:p>
             <a:fld id="{BD062408-EA1B-994F-9E64-636DB23DCB45}" type="datetimeFigureOut">
               <a:rPr lang="en-US" smtClean="0"/>
-              <a:t>5/2/17</a:t>
+              <a:t>5/3/17</a:t>
             </a:fld>
             <a:endParaRPr lang="en-US"/>
           </a:p>
@@ -2259,7 +2259,7 @@
           <a:p>
             <a:fld id="{BD062408-EA1B-994F-9E64-636DB23DCB45}" type="datetimeFigureOut">
               <a:rPr lang="en-US" smtClean="0"/>
-              <a:t>5/2/17</a:t>
+              <a:t>5/3/17</a:t>
             </a:fld>
             <a:endParaRPr lang="en-US"/>
           </a:p>
@@ -2512,7 +2512,7 @@
           <a:p>
             <a:fld id="{BD062408-EA1B-994F-9E64-636DB23DCB45}" type="datetimeFigureOut">
               <a:rPr lang="en-US" smtClean="0"/>
-              <a:t>5/2/17</a:t>
+              <a:t>5/3/17</a:t>
             </a:fld>
             <a:endParaRPr lang="en-US"/>
           </a:p>
@@ -2725,7 +2725,7 @@
           <a:p>
             <a:fld id="{BD062408-EA1B-994F-9E64-636DB23DCB45}" type="datetimeFigureOut">
               <a:rPr lang="en-US" smtClean="0"/>
-              <a:t>5/2/17</a:t>
+              <a:t>5/3/17</a:t>
             </a:fld>
             <a:endParaRPr lang="en-US"/>
           </a:p>
@@ -3102,7 +3102,7 @@
       </p:grpSpPr>
       <p:pic>
         <p:nvPicPr>
-          <p:cNvPr id="7" name="Picture 6" descr="24tilefactoryMove18.pdf"/>
+          <p:cNvPr id="3" name="Picture 2" descr="fig1b1move18temp.pdf"/>
           <p:cNvPicPr>
             <a:picLocks noChangeAspect="1"/>
           </p:cNvPicPr>
@@ -3116,13 +3116,13 @@
               </a:ext>
             </a:extLst>
           </a:blip>
-          <a:srcRect l="14607" t="38785" r="11979" b="40955"/>
+          <a:srcRect l="14608" t="39363" r="11603" b="40955"/>
           <a:stretch/>
         </p:blipFill>
         <p:spPr>
           <a:xfrm>
-            <a:off x="-69849" y="-104510"/>
-            <a:ext cx="6568952" cy="2346060"/>
+            <a:off x="-69849" y="-76200"/>
+            <a:ext cx="6600980" cy="2278511"/>
           </a:xfrm>
           <a:prstGeom prst="rect">
             <a:avLst/>

</xml_diff>